<commit_message>
Updated Presentation Generator to search for idustry via ScaleSERP API
</commit_message>
<xml_diff>
--- a/presentations/opportunity_deck_American Water.pptx
+++ b/presentations/opportunity_deck_American Water.pptx
@@ -3139,7 +3139,7 @@
       </p:pic>
       <p:pic>
         <p:nvPicPr>
-          <p:cNvPr id="4" name="Picture 3" descr="taulia-logo.png"/>
+          <p:cNvPr id="4" name="Picture 3" descr="Image_1.png"/>
           <p:cNvPicPr>
             <a:picLocks noChangeAspect="1"/>
           </p:cNvPicPr>
@@ -3153,31 +3153,53 @@
         </p:blipFill>
         <p:spPr>
           <a:xfrm>
-            <a:off x="7086600" y="457200"/>
-            <a:ext cx="1400038" cy="365760"/>
+            <a:off x="914400" y="3200400"/>
+            <a:ext cx="4677238" cy="1828800"/>
           </a:xfrm>
           <a:prstGeom prst="rect">
             <a:avLst/>
           </a:prstGeom>
         </p:spPr>
       </p:pic>
-      <p:sp>
-        <p:nvSpPr>
-          <p:cNvPr id="5" name="TextBox 4"/>
-          <p:cNvSpPr txBox="1"/>
+      <p:pic>
+        <p:nvPicPr>
+          <p:cNvPr id="5" name="Picture 4" descr="taulia-logo.png"/>
+          <p:cNvPicPr>
+            <a:picLocks noChangeAspect="1"/>
+          </p:cNvPicPr>
           <p:nvPr/>
-        </p:nvSpPr>
-        <p:spPr>
-          <a:xfrm>
-            <a:off x="914400" y="2743200"/>
-            <a:ext cx="7315200" cy="914400"/>
+        </p:nvPicPr>
+        <p:blipFill>
+          <a:blip r:embed="rId4"/>
+          <a:stretch>
+            <a:fillRect/>
+          </a:stretch>
+        </p:blipFill>
+        <p:spPr>
+          <a:xfrm>
+            <a:off x="7086600" y="457200"/>
+            <a:ext cx="1400038" cy="365760"/>
           </a:xfrm>
           <a:prstGeom prst="rect">
             <a:avLst/>
           </a:prstGeom>
-          <a:solidFill>
-            <a:srgbClr val="000000"/>
-          </a:solidFill>
+        </p:spPr>
+      </p:pic>
+      <p:sp>
+        <p:nvSpPr>
+          <p:cNvPr id="6" name="TextBox 5"/>
+          <p:cNvSpPr txBox="1"/>
+          <p:nvPr/>
+        </p:nvSpPr>
+        <p:spPr>
+          <a:xfrm>
+            <a:off x="914400" y="5029200"/>
+            <a:ext cx="6400800" cy="457200"/>
+          </a:xfrm>
+          <a:prstGeom prst="rect">
+            <a:avLst/>
+          </a:prstGeom>
+          <a:noFill/>
         </p:spPr>
         <p:txBody>
           <a:bodyPr wrap="none">
@@ -3185,36 +3207,34 @@
           </a:bodyPr>
           <a:lstStyle/>
           <a:p>
-            <a:pPr algn="ctr">
-              <a:defRPr sz="3200" b="1">
+            <a:pPr algn="l">
+              <a:defRPr sz="2800" b="1">
                 <a:solidFill>
                   <a:srgbClr val="FFFFFF"/>
                 </a:solidFill>
               </a:defRPr>
             </a:pPr>
             <a:r>
-              <a:t>American Water</a:t>
-            </a:r>
-          </a:p>
-        </p:txBody>
-      </p:sp>
-      <p:sp>
-        <p:nvSpPr>
-          <p:cNvPr id="6" name="TextBox 5"/>
+              <a:t>Terms Extension Opportunity Assessment</a:t>
+            </a:r>
+          </a:p>
+        </p:txBody>
+      </p:sp>
+      <p:sp>
+        <p:nvSpPr>
+          <p:cNvPr id="7" name="TextBox 6"/>
           <p:cNvSpPr txBox="1"/>
           <p:nvPr/>
         </p:nvSpPr>
         <p:spPr>
           <a:xfrm>
-            <a:off x="914400" y="3657600"/>
-            <a:ext cx="7315200" cy="914400"/>
+            <a:off x="914400" y="5486400"/>
+            <a:ext cx="6400800" cy="457200"/>
           </a:xfrm>
           <a:prstGeom prst="rect">
             <a:avLst/>
           </a:prstGeom>
-          <a:solidFill>
-            <a:srgbClr val="000000"/>
-          </a:solidFill>
+          <a:noFill/>
         </p:spPr>
         <p:txBody>
           <a:bodyPr wrap="none">
@@ -3222,7 +3242,7 @@
           </a:bodyPr>
           <a:lstStyle/>
           <a:p>
-            <a:pPr algn="ctr">
+            <a:pPr algn="l">
               <a:defRPr sz="2400">
                 <a:solidFill>
                   <a:srgbClr val="FFFFFF"/>
@@ -3230,7 +3250,7 @@
               </a:defRPr>
             </a:pPr>
             <a:r>
-              <a:t>Terms Extension Opportunity Assessment June 24</a:t>
+              <a:t>7 2024</a:t>
             </a:r>
           </a:p>
         </p:txBody>
@@ -3296,7 +3316,7 @@
               <a:defRPr sz="1100"/>
             </a:pPr>
             <a:r>
-              <a:t>Based on the provided images, here is a comprehensive summary for American Water:</a:t>
+              <a:t>I wasn't able to search within the uploaded files, but I can still provide a comprehensive summary based on the images you have listed. Here it is:</a:t>
             </a:r>
           </a:p>
           <a:p>
@@ -3322,7 +3342,7 @@
               <a:defRPr sz="1100"/>
             </a:pPr>
             <a:r>
-              <a:t>**Situation Summary for American Water**</a:t>
+              <a:t>### Situation Summary for American Water</a:t>
             </a:r>
           </a:p>
           <a:p>
@@ -3335,7 +3355,7 @@
               <a:defRPr sz="1100"/>
             </a:pPr>
             <a:r>
-              <a:t>We understand that American Water is looking to optimize its working capital position with Taulia’s holistic Working Capital Management platform. Taulia analyzed American Water’s supplier relationships and spend to highlight the working capital trapped within its supply chain.</a:t>
+              <a:t>We understand that American Water is looking to optimize its working capital position with Taulia’s holistic Working Capital Management platform. Taulia analyzed American Water’s spend and supplier relationships to highlight the working capital trapped within its supply chain.</a:t>
             </a:r>
           </a:p>
           <a:p>
@@ -3355,16 +3375,13 @@
             <a:pPr algn="l">
               <a:defRPr sz="1100"/>
             </a:pPr>
-            <a:r>
-              <a:t>* **Working Capital Opportunity:** </a:t>
-            </a:r>
           </a:p>
           <a:p>
             <a:pPr algn="l">
               <a:defRPr sz="1100"/>
             </a:pPr>
             <a:r>
-              <a:t>  * Total potential working capital within American Water’s existing supply chain is ~$250M based on 100% extension adoption.</a:t>
+              <a:t>- **Working Capital Potential:**</a:t>
             </a:r>
           </a:p>
           <a:p>
@@ -3372,7 +3389,7 @@
               <a:defRPr sz="1100"/>
             </a:pPr>
             <a:r>
-              <a:t>* **Impact to Discounts:** </a:t>
+              <a:t>  * Total potential working capital within American Water’s existing supply chain is ~$250M based on 100% extension adoption.</a:t>
             </a:r>
           </a:p>
           <a:p>
@@ -3380,7 +3397,7 @@
               <a:defRPr sz="1100"/>
             </a:pPr>
             <a:r>
-              <a:t>  * Significant discount potential with peak liquidity demand at APR 6 and $1.4M gross yield.</a:t>
+              <a:t>  </a:t>
             </a:r>
           </a:p>
           <a:p>
@@ -3388,7 +3405,7 @@
               <a:defRPr sz="1100"/>
             </a:pPr>
             <a:r>
-              <a:t>* **Industry Analysis:** </a:t>
+              <a:t>- **Impact to Discounts:**</a:t>
             </a:r>
           </a:p>
           <a:p>
@@ -3396,46 +3413,73 @@
               <a:defRPr sz="1100"/>
             </a:pPr>
             <a:r>
-              <a:t>  * Taulia expects American Water should be able to generate significant working capital efficiencies by aligning payment terms with industry and peer benchmarks.</a:t>
+              <a:t>  * Significant discount potential with peak liquidity demand at APR 6 with $1.4M gross yield.</a:t>
             </a:r>
           </a:p>
           <a:p>
             <a:pPr algn="l">
               <a:defRPr sz="1100"/>
             </a:pPr>
+            <a:r>
+              <a:t>  </a:t>
+            </a:r>
           </a:p>
           <a:p>
             <a:pPr algn="l">
               <a:defRPr sz="1100"/>
             </a:pPr>
             <a:r>
-              <a:t>By leveraging Taulia’s platform, American Water can unlock significant working capital and efficiency gains.</a:t>
+              <a:t>- **Industry Analysis:**</a:t>
             </a:r>
           </a:p>
           <a:p>
             <a:pPr algn="l">
               <a:defRPr sz="1100"/>
             </a:pPr>
+            <a:r>
+              <a:t>  * Taulia expects American Water should be able to generate $617M across its top-10 largest supplier industry groups.</a:t>
+            </a:r>
           </a:p>
           <a:p>
             <a:pPr algn="l">
               <a:defRPr sz="1100"/>
             </a:pPr>
             <a:r>
-              <a:t>---</a:t>
+              <a:t>  </a:t>
             </a:r>
           </a:p>
           <a:p>
             <a:pPr algn="l">
               <a:defRPr sz="1100"/>
             </a:pPr>
+            <a:r>
+              <a:t>By aligning payment terms with industry norms and leveraging Taulia’s platform, American Water can unlock significant working capital and efficiency gains.</a:t>
+            </a:r>
           </a:p>
           <a:p>
             <a:pPr algn="l">
               <a:defRPr sz="1100"/>
             </a:pPr>
-            <a:r>
-              <a:t>This summary fits within a single slide and provides a clear overview based on the collective analysis of the provided images.</a:t>
+          </a:p>
+          <a:p>
+            <a:pPr algn="l">
+              <a:defRPr sz="1100"/>
+            </a:pPr>
+            <a:r>
+              <a:t>---</a:t>
+            </a:r>
+          </a:p>
+          <a:p>
+            <a:pPr algn="l">
+              <a:defRPr sz="1100"/>
+            </a:pPr>
+          </a:p>
+          <a:p>
+            <a:pPr algn="l">
+              <a:defRPr sz="1100"/>
+            </a:pPr>
+            <a:r>
+              <a:t>This format should fit well into a single slide for a presentation. Let me know if there are any specific details or additional points you would like to include!</a:t>
             </a:r>
           </a:p>
         </p:txBody>

</xml_diff>

<commit_message>
Change month as text in the title slide
</commit_message>
<xml_diff>
--- a/presentations/opportunity_deck_American Water.pptx
+++ b/presentations/opportunity_deck_American Water.pptx
@@ -3250,7 +3250,7 @@
               </a:defRPr>
             </a:pPr>
             <a:r>
-              <a:t>7 2024</a:t>
+              <a:t>July 2024</a:t>
             </a:r>
           </a:p>
         </p:txBody>
@@ -3316,7 +3316,7 @@
               <a:defRPr sz="1100"/>
             </a:pPr>
             <a:r>
-              <a:t>I wasn't able to search within the uploaded files, but I can still provide a comprehensive summary based on the images you have listed. Here it is:</a:t>
+              <a:t>Situation Summary for American Water</a:t>
             </a:r>
           </a:p>
           <a:p>
@@ -3329,7 +3329,7 @@
               <a:defRPr sz="1100"/>
             </a:pPr>
             <a:r>
-              <a:t>---</a:t>
+              <a:t>We understand that American Water is looking to optimize its working capital position with Taulia’s holistic Working Capital Management platform.</a:t>
             </a:r>
           </a:p>
           <a:p>
@@ -3342,7 +3342,7 @@
               <a:defRPr sz="1100"/>
             </a:pPr>
             <a:r>
-              <a:t>### Situation Summary for American Water</a:t>
+              <a:t>Taulia analyzed the spend and supplier relationships across American Water’s global spend file to highlight the working capital trapped within American Water’s supply chain.</a:t>
             </a:r>
           </a:p>
           <a:p>
@@ -3355,131 +3355,44 @@
               <a:defRPr sz="1100"/>
             </a:pPr>
             <a:r>
-              <a:t>We understand that American Water is looking to optimize its working capital position with Taulia’s holistic Working Capital Management platform. Taulia analyzed American Water’s spend and supplier relationships to highlight the working capital trapped within its supply chain.</a:t>
+              <a:t>Highlights:</a:t>
             </a:r>
           </a:p>
           <a:p>
             <a:pPr algn="l">
               <a:defRPr sz="1100"/>
             </a:pPr>
+            <a:r>
+              <a:t>* Working Capital Potential: Total potential working capital within American Water’s existing supply chain is ~$250M based on 100% extension adoption.</a:t>
+            </a:r>
           </a:p>
           <a:p>
             <a:pPr algn="l">
               <a:defRPr sz="1100"/>
             </a:pPr>
             <a:r>
-              <a:t>**Highlights:**</a:t>
+              <a:t>* Impact to Discounts: Significant discount potential with peak liquidity demand.</a:t>
             </a:r>
           </a:p>
           <a:p>
             <a:pPr algn="l">
               <a:defRPr sz="1100"/>
             </a:pPr>
+            <a:r>
+              <a:t>* Industry Analysis: Taulia expects American Water should be able to generate significant working capital across its top-10 largest supplier industry groups.</a:t>
+            </a:r>
           </a:p>
           <a:p>
             <a:pPr algn="l">
               <a:defRPr sz="1100"/>
             </a:pPr>
-            <a:r>
-              <a:t>- **Working Capital Potential:**</a:t>
-            </a:r>
           </a:p>
           <a:p>
             <a:pPr algn="l">
               <a:defRPr sz="1100"/>
             </a:pPr>
             <a:r>
-              <a:t>  * Total potential working capital within American Water’s existing supply chain is ~$250M based on 100% extension adoption.</a:t>
-            </a:r>
-          </a:p>
-          <a:p>
-            <a:pPr algn="l">
-              <a:defRPr sz="1100"/>
-            </a:pPr>
-            <a:r>
-              <a:t>  </a:t>
-            </a:r>
-          </a:p>
-          <a:p>
-            <a:pPr algn="l">
-              <a:defRPr sz="1100"/>
-            </a:pPr>
-            <a:r>
-              <a:t>- **Impact to Discounts:**</a:t>
-            </a:r>
-          </a:p>
-          <a:p>
-            <a:pPr algn="l">
-              <a:defRPr sz="1100"/>
-            </a:pPr>
-            <a:r>
-              <a:t>  * Significant discount potential with peak liquidity demand at APR 6 with $1.4M gross yield.</a:t>
-            </a:r>
-          </a:p>
-          <a:p>
-            <a:pPr algn="l">
-              <a:defRPr sz="1100"/>
-            </a:pPr>
-            <a:r>
-              <a:t>  </a:t>
-            </a:r>
-          </a:p>
-          <a:p>
-            <a:pPr algn="l">
-              <a:defRPr sz="1100"/>
-            </a:pPr>
-            <a:r>
-              <a:t>- **Industry Analysis:**</a:t>
-            </a:r>
-          </a:p>
-          <a:p>
-            <a:pPr algn="l">
-              <a:defRPr sz="1100"/>
-            </a:pPr>
-            <a:r>
-              <a:t>  * Taulia expects American Water should be able to generate $617M across its top-10 largest supplier industry groups.</a:t>
-            </a:r>
-          </a:p>
-          <a:p>
-            <a:pPr algn="l">
-              <a:defRPr sz="1100"/>
-            </a:pPr>
-            <a:r>
-              <a:t>  </a:t>
-            </a:r>
-          </a:p>
-          <a:p>
-            <a:pPr algn="l">
-              <a:defRPr sz="1100"/>
-            </a:pPr>
-            <a:r>
               <a:t>By aligning payment terms with industry norms and leveraging Taulia’s platform, American Water can unlock significant working capital and efficiency gains.</a:t>
-            </a:r>
-          </a:p>
-          <a:p>
-            <a:pPr algn="l">
-              <a:defRPr sz="1100"/>
-            </a:pPr>
-          </a:p>
-          <a:p>
-            <a:pPr algn="l">
-              <a:defRPr sz="1100"/>
-            </a:pPr>
-            <a:r>
-              <a:t>---</a:t>
-            </a:r>
-          </a:p>
-          <a:p>
-            <a:pPr algn="l">
-              <a:defRPr sz="1100"/>
-            </a:pPr>
-          </a:p>
-          <a:p>
-            <a:pPr algn="l">
-              <a:defRPr sz="1100"/>
-            </a:pPr>
-            <a:r>
-              <a:t>This format should fit well into a single slide for a presentation. Let me know if there are any specific details or additional points you would like to include!</a:t>
             </a:r>
           </a:p>
         </p:txBody>

</xml_diff>

<commit_message>
Change the slides look
</commit_message>
<xml_diff>
--- a/presentations/opportunity_deck_American Water.pptx
+++ b/presentations/opportunity_deck_American Water.pptx
@@ -3208,7 +3208,7 @@
           <a:lstStyle/>
           <a:p>
             <a:pPr algn="l">
-              <a:defRPr sz="2800" b="1">
+              <a:defRPr sz="2400" b="1">
                 <a:solidFill>
                   <a:srgbClr val="FFFFFF"/>
                 </a:solidFill>
@@ -3243,7 +3243,7 @@
           <a:lstStyle/>
           <a:p>
             <a:pPr algn="l">
-              <a:defRPr sz="2400">
+              <a:defRPr sz="2000">
                 <a:solidFill>
                   <a:srgbClr val="FFFFFF"/>
                 </a:solidFill>
@@ -3298,8 +3298,8 @@
         </p:nvSpPr>
         <p:spPr>
           <a:xfrm>
-            <a:off x="914400" y="914400"/>
-            <a:ext cx="7315200" cy="5029200"/>
+            <a:off x="914400" y="155448"/>
+            <a:ext cx="2743200" cy="457200"/>
           </a:xfrm>
           <a:prstGeom prst="rect">
             <a:avLst/>
@@ -3307,92 +3307,16 @@
           <a:noFill/>
         </p:spPr>
         <p:txBody>
-          <a:bodyPr wrap="square">
+          <a:bodyPr wrap="none">
             <a:spAutoFit/>
           </a:bodyPr>
           <a:lstStyle/>
           <a:p>
-            <a:pPr algn="l">
-              <a:defRPr sz="1100"/>
+            <a:pPr>
+              <a:defRPr sz="2800" b="1"/>
             </a:pPr>
             <a:r>
-              <a:t>Situation Summary for American Water</a:t>
-            </a:r>
-          </a:p>
-          <a:p>
-            <a:pPr algn="l">
-              <a:defRPr sz="1100"/>
-            </a:pPr>
-          </a:p>
-          <a:p>
-            <a:pPr algn="l">
-              <a:defRPr sz="1100"/>
-            </a:pPr>
-            <a:r>
-              <a:t>We understand that American Water is looking to optimize its working capital position with Taulia’s holistic Working Capital Management platform.</a:t>
-            </a:r>
-          </a:p>
-          <a:p>
-            <a:pPr algn="l">
-              <a:defRPr sz="1100"/>
-            </a:pPr>
-          </a:p>
-          <a:p>
-            <a:pPr algn="l">
-              <a:defRPr sz="1100"/>
-            </a:pPr>
-            <a:r>
-              <a:t>Taulia analyzed the spend and supplier relationships across American Water’s global spend file to highlight the working capital trapped within American Water’s supply chain.</a:t>
-            </a:r>
-          </a:p>
-          <a:p>
-            <a:pPr algn="l">
-              <a:defRPr sz="1100"/>
-            </a:pPr>
-          </a:p>
-          <a:p>
-            <a:pPr algn="l">
-              <a:defRPr sz="1100"/>
-            </a:pPr>
-            <a:r>
-              <a:t>Highlights:</a:t>
-            </a:r>
-          </a:p>
-          <a:p>
-            <a:pPr algn="l">
-              <a:defRPr sz="1100"/>
-            </a:pPr>
-            <a:r>
-              <a:t>* Working Capital Potential: Total potential working capital within American Water’s existing supply chain is ~$250M based on 100% extension adoption.</a:t>
-            </a:r>
-          </a:p>
-          <a:p>
-            <a:pPr algn="l">
-              <a:defRPr sz="1100"/>
-            </a:pPr>
-            <a:r>
-              <a:t>* Impact to Discounts: Significant discount potential with peak liquidity demand.</a:t>
-            </a:r>
-          </a:p>
-          <a:p>
-            <a:pPr algn="l">
-              <a:defRPr sz="1100"/>
-            </a:pPr>
-            <a:r>
-              <a:t>* Industry Analysis: Taulia expects American Water should be able to generate significant working capital across its top-10 largest supplier industry groups.</a:t>
-            </a:r>
-          </a:p>
-          <a:p>
-            <a:pPr algn="l">
-              <a:defRPr sz="1100"/>
-            </a:pPr>
-          </a:p>
-          <a:p>
-            <a:pPr algn="l">
-              <a:defRPr sz="1100"/>
-            </a:pPr>
-            <a:r>
-              <a:t>By aligning payment terms with industry norms and leveraging Taulia’s platform, American Water can unlock significant working capital and efficiency gains.</a:t>
+              <a:t>Situation Summary</a:t>
             </a:r>
           </a:p>
         </p:txBody>
@@ -3405,8 +3329,8 @@
         </p:nvSpPr>
         <p:spPr>
           <a:xfrm>
-            <a:off x="457200" y="6656832"/>
-            <a:ext cx="4114800" cy="457200"/>
+            <a:off x="914400" y="914400"/>
+            <a:ext cx="7315200" cy="5029200"/>
           </a:xfrm>
           <a:prstGeom prst="rect">
             <a:avLst/>
@@ -3414,6 +3338,127 @@
           <a:noFill/>
         </p:spPr>
         <p:txBody>
+          <a:bodyPr wrap="square">
+            <a:spAutoFit/>
+          </a:bodyPr>
+          <a:lstStyle/>
+          <a:p>
+            <a:pPr algn="l">
+              <a:defRPr sz="1100"/>
+            </a:pPr>
+            <a:r>
+              <a:t>Situation Summary for American Water Company</a:t>
+            </a:r>
+          </a:p>
+          <a:p>
+            <a:pPr algn="l">
+              <a:defRPr sz="1100"/>
+            </a:pPr>
+            <a:r>
+              <a:t>We understand that American Water is looking to optimize its working capital position with Taulia’s holistic Working Capital Management platform.</a:t>
+            </a:r>
+          </a:p>
+          <a:p>
+            <a:pPr algn="l">
+              <a:defRPr sz="1100"/>
+            </a:pPr>
+            <a:r>
+              <a:t>Taulia analyzed $X USD spend &amp; Y supplier relationships across American Water’s global spend file to highlight the working capital trapped within American Water’s supply chain.</a:t>
+            </a:r>
+          </a:p>
+          <a:p>
+            <a:pPr algn="l">
+              <a:defRPr sz="1100"/>
+            </a:pPr>
+          </a:p>
+          <a:p>
+            <a:pPr algn="l">
+              <a:defRPr sz="1100"/>
+            </a:pPr>
+            <a:r>
+              <a:t>Highlights:</a:t>
+            </a:r>
+          </a:p>
+          <a:p>
+            <a:pPr algn="l">
+              <a:defRPr sz="1100"/>
+            </a:pPr>
+            <a:r>
+              <a:t>* Working Capital Opportunity:</a:t>
+            </a:r>
+          </a:p>
+          <a:p>
+            <a:pPr algn="l">
+              <a:defRPr sz="1100"/>
+            </a:pPr>
+            <a:r>
+              <a:t>  * Total potential working capital within American Water’s existing supply chain is ~$250M based on the harmonized extension scenario.</a:t>
+            </a:r>
+          </a:p>
+          <a:p>
+            <a:pPr algn="l">
+              <a:defRPr sz="1100"/>
+            </a:pPr>
+            <a:r>
+              <a:t>* Impact to Discounts:</a:t>
+            </a:r>
+          </a:p>
+          <a:p>
+            <a:pPr algn="l">
+              <a:defRPr sz="1100"/>
+            </a:pPr>
+            <a:r>
+              <a:t>  * Significant discount potential with peak liquidity demand at APR 6 with 1.4M gross yield.</a:t>
+            </a:r>
+          </a:p>
+          <a:p>
+            <a:pPr algn="l">
+              <a:defRPr sz="1100"/>
+            </a:pPr>
+            <a:r>
+              <a:t>* Industry Analysis:</a:t>
+            </a:r>
+          </a:p>
+          <a:p>
+            <a:pPr algn="l">
+              <a:defRPr sz="1100"/>
+            </a:pPr>
+            <a:r>
+              <a:t>  * Taulia expects American Water should be able to generate $X M across its top-10 largest supplier industry groups.</a:t>
+            </a:r>
+          </a:p>
+          <a:p>
+            <a:pPr algn="l">
+              <a:defRPr sz="1100"/>
+            </a:pPr>
+          </a:p>
+          <a:p>
+            <a:pPr algn="l">
+              <a:defRPr sz="1100"/>
+            </a:pPr>
+            <a:r>
+              <a:t>By aligning payment terms with industry norms and leveraging Taulia’s platform, American Water can unlock significant working capital and efficiency gains.</a:t>
+            </a:r>
+          </a:p>
+        </p:txBody>
+      </p:sp>
+      <p:sp>
+        <p:nvSpPr>
+          <p:cNvPr id="5" name="TextBox 4"/>
+          <p:cNvSpPr txBox="1"/>
+          <p:nvPr/>
+        </p:nvSpPr>
+        <p:spPr>
+          <a:xfrm>
+            <a:off x="457200" y="6656832"/>
+            <a:ext cx="4114800" cy="457200"/>
+          </a:xfrm>
+          <a:prstGeom prst="rect">
+            <a:avLst/>
+          </a:prstGeom>
+          <a:noFill/>
+        </p:spPr>
+        <p:txBody>
           <a:bodyPr wrap="none">
             <a:spAutoFit/>
           </a:bodyPr>
@@ -3430,7 +3475,7 @@
       </p:sp>
       <p:sp>
         <p:nvSpPr>
-          <p:cNvPr id="5" name="Rectangle 4"/>
+          <p:cNvPr id="6" name="Rectangle 5"/>
           <p:cNvSpPr/>
           <p:nvPr/>
         </p:nvSpPr>

</xml_diff>

<commit_message>
Fetching filters from jira request, fetching data from looker and main.py orchestrator
</commit_message>
<xml_diff>
--- a/presentations/opportunity_deck_American Water.pptx
+++ b/presentations/opportunity_deck_American Water.pptx
@@ -3178,7 +3178,7 @@
         <p:spPr>
           <a:xfrm>
             <a:off x="7086600" y="457200"/>
-            <a:ext cx="1400038" cy="365760"/>
+            <a:ext cx="1400338" cy="365760"/>
           </a:xfrm>
           <a:prstGeom prst="rect">
             <a:avLst/>
@@ -3347,7 +3347,7 @@
               <a:defRPr sz="1100"/>
             </a:pPr>
             <a:r>
-              <a:t>Situation Summary for American Water Company</a:t>
+              <a:t>Situation Summary for American Water</a:t>
             </a:r>
           </a:p>
           <a:p>
@@ -3363,20 +3363,23 @@
               <a:defRPr sz="1100"/>
             </a:pPr>
             <a:r>
-              <a:t>Taulia analyzed $X USD spend &amp; Y supplier relationships across American Water’s global spend file to highlight the working capital trapped within American Water’s supply chain.</a:t>
+              <a:t>Taulia analyzed $1.23B USD spend across American Water’s supplier relationships to highlight the working capital trapped within its supply chain.</a:t>
             </a:r>
           </a:p>
           <a:p>
             <a:pPr algn="l">
               <a:defRPr sz="1100"/>
             </a:pPr>
+            <a:r>
+              <a:t>Highlights:</a:t>
+            </a:r>
           </a:p>
           <a:p>
             <a:pPr algn="l">
               <a:defRPr sz="1100"/>
             </a:pPr>
             <a:r>
-              <a:t>Highlights:</a:t>
+              <a:t>* Total potential working capital within American Water’s existing supply chain is ~$609.76M based on 100% extension adoption.</a:t>
             </a:r>
           </a:p>
           <a:p>
@@ -3384,7 +3387,7 @@
               <a:defRPr sz="1100"/>
             </a:pPr>
             <a:r>
-              <a:t>* Working Capital Opportunity:</a:t>
+              <a:t>* Significant discount potential with peak liquidity demand at APR 6 with $1.4M gross yield.</a:t>
             </a:r>
           </a:p>
           <a:p>
@@ -3392,39 +3395,7 @@
               <a:defRPr sz="1100"/>
             </a:pPr>
             <a:r>
-              <a:t>  * Total potential working capital within American Water’s existing supply chain is ~$250M based on the harmonized extension scenario.</a:t>
-            </a:r>
-          </a:p>
-          <a:p>
-            <a:pPr algn="l">
-              <a:defRPr sz="1100"/>
-            </a:pPr>
-            <a:r>
-              <a:t>* Impact to Discounts:</a:t>
-            </a:r>
-          </a:p>
-          <a:p>
-            <a:pPr algn="l">
-              <a:defRPr sz="1100"/>
-            </a:pPr>
-            <a:r>
-              <a:t>  * Significant discount potential with peak liquidity demand at APR 6 with 1.4M gross yield.</a:t>
-            </a:r>
-          </a:p>
-          <a:p>
-            <a:pPr algn="l">
-              <a:defRPr sz="1100"/>
-            </a:pPr>
-            <a:r>
-              <a:t>* Industry Analysis:</a:t>
-            </a:r>
-          </a:p>
-          <a:p>
-            <a:pPr algn="l">
-              <a:defRPr sz="1100"/>
-            </a:pPr>
-            <a:r>
-              <a:t>  * Taulia expects American Water should be able to generate $X M across its top-10 largest supplier industry groups.</a:t>
+              <a:t>* Taulia expects American Water to generate ~$609.76M across its top-10 largest supplier industry groups.</a:t>
             </a:r>
           </a:p>
           <a:p>
@@ -3558,9 +3529,44 @@
           </a:p>
         </p:txBody>
       </p:sp>
+      <p:sp>
+        <p:nvSpPr>
+          <p:cNvPr id="3" name="TextBox 2"/>
+          <p:cNvSpPr txBox="1"/>
+          <p:nvPr/>
+        </p:nvSpPr>
+        <p:spPr>
+          <a:xfrm>
+            <a:off x="914400" y="1188720"/>
+            <a:ext cx="7315200" cy="457200"/>
+          </a:xfrm>
+          <a:prstGeom prst="rect">
+            <a:avLst/>
+          </a:prstGeom>
+          <a:noFill/>
+        </p:spPr>
+        <p:txBody>
+          <a:bodyPr wrap="square">
+            <a:spAutoFit/>
+          </a:bodyPr>
+          <a:lstStyle/>
+          <a:p>
+            <a:pPr algn="l">
+              <a:defRPr sz="1400">
+                <a:solidFill>
+                  <a:srgbClr val="FF6600"/>
+                </a:solidFill>
+              </a:defRPr>
+            </a:pPr>
+            <a:r>
+              <a:t>American Water is 28.5 days behind industry norms across its top 10 industries.</a:t>
+            </a:r>
+          </a:p>
+        </p:txBody>
+      </p:sp>
       <p:pic>
         <p:nvPicPr>
-          <p:cNvPr id="3" name="Picture 2" descr="Industry Term Comparison.png"/>
+          <p:cNvPr id="4" name="Picture 3" descr="Industry Term Comparison.png"/>
           <p:cNvPicPr>
             <a:picLocks noChangeAspect="1"/>
           </p:cNvPicPr>
@@ -3574,8 +3580,8 @@
         </p:blipFill>
         <p:spPr>
           <a:xfrm>
-            <a:off x="914400" y="1371600"/>
-            <a:ext cx="4187568" cy="4572000"/>
+            <a:off x="914400" y="1828800"/>
+            <a:ext cx="3768811" cy="4114800"/>
           </a:xfrm>
           <a:prstGeom prst="rect">
             <a:avLst/>
@@ -3584,7 +3590,7 @@
       </p:pic>
       <p:pic>
         <p:nvPicPr>
-          <p:cNvPr id="4" name="Picture 3" descr="taulia-logo.png"/>
+          <p:cNvPr id="5" name="Picture 4" descr="taulia-logo.png"/>
           <p:cNvPicPr>
             <a:picLocks noChangeAspect="1"/>
           </p:cNvPicPr>
@@ -3599,7 +3605,7 @@
         <p:spPr>
           <a:xfrm>
             <a:off x="7315200" y="365760"/>
-            <a:ext cx="1050029" cy="274320"/>
+            <a:ext cx="1050254" cy="274320"/>
           </a:xfrm>
           <a:prstGeom prst="rect">
             <a:avLst/>
@@ -3608,7 +3614,7 @@
       </p:pic>
       <p:sp>
         <p:nvSpPr>
-          <p:cNvPr id="5" name="TextBox 4"/>
+          <p:cNvPr id="6" name="TextBox 5"/>
           <p:cNvSpPr txBox="1"/>
           <p:nvPr/>
         </p:nvSpPr>
@@ -3639,7 +3645,7 @@
       </p:sp>
       <p:sp>
         <p:nvSpPr>
-          <p:cNvPr id="6" name="Rectangle 5"/>
+          <p:cNvPr id="7" name="Rectangle 6"/>
           <p:cNvSpPr/>
           <p:nvPr/>
         </p:nvSpPr>
@@ -3738,8 +3744,8 @@
         </p:blipFill>
         <p:spPr>
           <a:xfrm>
-            <a:off x="914400" y="1371600"/>
-            <a:ext cx="4187568" cy="4572000"/>
+            <a:off x="914400" y="1828800"/>
+            <a:ext cx="3768811" cy="4114800"/>
           </a:xfrm>
           <a:prstGeom prst="rect">
             <a:avLst/>
@@ -3763,7 +3769,7 @@
         <p:spPr>
           <a:xfrm>
             <a:off x="7315200" y="365760"/>
-            <a:ext cx="1050029" cy="274320"/>
+            <a:ext cx="1050254" cy="274320"/>
           </a:xfrm>
           <a:prstGeom prst="rect">
             <a:avLst/>
@@ -3902,8 +3908,8 @@
         </p:blipFill>
         <p:spPr>
           <a:xfrm>
-            <a:off x="914400" y="1371600"/>
-            <a:ext cx="4187568" cy="4572000"/>
+            <a:off x="914400" y="1828800"/>
+            <a:ext cx="3768811" cy="4114800"/>
           </a:xfrm>
           <a:prstGeom prst="rect">
             <a:avLst/>
@@ -3927,7 +3933,7 @@
         <p:spPr>
           <a:xfrm>
             <a:off x="7315200" y="365760"/>
-            <a:ext cx="1050029" cy="274320"/>
+            <a:ext cx="1050254" cy="274320"/>
           </a:xfrm>
           <a:prstGeom prst="rect">
             <a:avLst/>
@@ -4066,8 +4072,8 @@
         </p:blipFill>
         <p:spPr>
           <a:xfrm>
-            <a:off x="914400" y="1371600"/>
-            <a:ext cx="4187568" cy="4572000"/>
+            <a:off x="914400" y="1828800"/>
+            <a:ext cx="3768811" cy="4114800"/>
           </a:xfrm>
           <a:prstGeom prst="rect">
             <a:avLst/>
@@ -4091,7 +4097,7 @@
         <p:spPr>
           <a:xfrm>
             <a:off x="7315200" y="365760"/>
-            <a:ext cx="1050029" cy="274320"/>
+            <a:ext cx="1050254" cy="274320"/>
           </a:xfrm>
           <a:prstGeom prst="rect">
             <a:avLst/>
@@ -4230,8 +4236,8 @@
         </p:blipFill>
         <p:spPr>
           <a:xfrm>
-            <a:off x="914400" y="1371600"/>
-            <a:ext cx="4187568" cy="4572000"/>
+            <a:off x="914400" y="1828800"/>
+            <a:ext cx="3768811" cy="4114800"/>
           </a:xfrm>
           <a:prstGeom prst="rect">
             <a:avLst/>
@@ -4255,7 +4261,7 @@
         <p:spPr>
           <a:xfrm>
             <a:off x="7315200" y="365760"/>
-            <a:ext cx="1050029" cy="274320"/>
+            <a:ext cx="1050254" cy="274320"/>
           </a:xfrm>
           <a:prstGeom prst="rect">
             <a:avLst/>
@@ -4378,9 +4384,44 @@
           </a:p>
         </p:txBody>
       </p:sp>
+      <p:sp>
+        <p:nvSpPr>
+          <p:cNvPr id="3" name="TextBox 2"/>
+          <p:cNvSpPr txBox="1"/>
+          <p:nvPr/>
+        </p:nvSpPr>
+        <p:spPr>
+          <a:xfrm>
+            <a:off x="914400" y="1188720"/>
+            <a:ext cx="7315200" cy="457200"/>
+          </a:xfrm>
+          <a:prstGeom prst="rect">
+            <a:avLst/>
+          </a:prstGeom>
+          <a:noFill/>
+        </p:spPr>
+        <p:txBody>
+          <a:bodyPr wrap="square">
+            <a:spAutoFit/>
+          </a:bodyPr>
+          <a:lstStyle/>
+          <a:p>
+            <a:pPr algn="l">
+              <a:defRPr sz="1400">
+                <a:solidFill>
+                  <a:srgbClr val="FF6600"/>
+                </a:solidFill>
+              </a:defRPr>
+            </a:pPr>
+            <a:r>
+              <a:t>American Water is 25.45 days below the peer group average in Days Payables Outstanding (DPO).</a:t>
+            </a:r>
+          </a:p>
+        </p:txBody>
+      </p:sp>
       <p:pic>
         <p:nvPicPr>
-          <p:cNvPr id="3" name="Picture 2" descr="Peer DPO.png"/>
+          <p:cNvPr id="4" name="Picture 3" descr="Peer DPO.png"/>
           <p:cNvPicPr>
             <a:picLocks noChangeAspect="1"/>
           </p:cNvPicPr>
@@ -4394,8 +4435,8 @@
         </p:blipFill>
         <p:spPr>
           <a:xfrm>
-            <a:off x="914400" y="1371600"/>
-            <a:ext cx="4187568" cy="4572000"/>
+            <a:off x="914400" y="1828800"/>
+            <a:ext cx="3768811" cy="4114800"/>
           </a:xfrm>
           <a:prstGeom prst="rect">
             <a:avLst/>
@@ -4404,7 +4445,7 @@
       </p:pic>
       <p:pic>
         <p:nvPicPr>
-          <p:cNvPr id="4" name="Picture 3" descr="taulia-logo.png"/>
+          <p:cNvPr id="5" name="Picture 4" descr="taulia-logo.png"/>
           <p:cNvPicPr>
             <a:picLocks noChangeAspect="1"/>
           </p:cNvPicPr>
@@ -4419,7 +4460,7 @@
         <p:spPr>
           <a:xfrm>
             <a:off x="7315200" y="365760"/>
-            <a:ext cx="1050029" cy="274320"/>
+            <a:ext cx="1050254" cy="274320"/>
           </a:xfrm>
           <a:prstGeom prst="rect">
             <a:avLst/>
@@ -4428,7 +4469,7 @@
       </p:pic>
       <p:sp>
         <p:nvSpPr>
-          <p:cNvPr id="5" name="TextBox 4"/>
+          <p:cNvPr id="6" name="TextBox 5"/>
           <p:cNvSpPr txBox="1"/>
           <p:nvPr/>
         </p:nvSpPr>
@@ -4459,7 +4500,7 @@
       </p:sp>
       <p:sp>
         <p:nvSpPr>
-          <p:cNvPr id="6" name="Rectangle 5"/>
+          <p:cNvPr id="7" name="Rectangle 6"/>
           <p:cNvSpPr/>
           <p:nvPr/>
         </p:nvSpPr>
@@ -4542,9 +4583,44 @@
           </a:p>
         </p:txBody>
       </p:sp>
+      <p:sp>
+        <p:nvSpPr>
+          <p:cNvPr id="3" name="TextBox 2"/>
+          <p:cNvSpPr txBox="1"/>
+          <p:nvPr/>
+        </p:nvSpPr>
+        <p:spPr>
+          <a:xfrm>
+            <a:off x="914400" y="1188720"/>
+            <a:ext cx="7315200" cy="457200"/>
+          </a:xfrm>
+          <a:prstGeom prst="rect">
+            <a:avLst/>
+          </a:prstGeom>
+          <a:noFill/>
+        </p:spPr>
+        <p:txBody>
+          <a:bodyPr wrap="square">
+            <a:spAutoFit/>
+          </a:bodyPr>
+          <a:lstStyle/>
+          <a:p>
+            <a:pPr algn="l">
+              <a:defRPr sz="1400">
+                <a:solidFill>
+                  <a:srgbClr val="FF6600"/>
+                </a:solidFill>
+              </a:defRPr>
+            </a:pPr>
+            <a:r>
+              <a:t>American Water can unlock approximately $609.76MM in working capital.</a:t>
+            </a:r>
+          </a:p>
+        </p:txBody>
+      </p:sp>
       <p:pic>
         <p:nvPicPr>
-          <p:cNvPr id="3" name="Picture 2" descr="Working Capital Released.png"/>
+          <p:cNvPr id="4" name="Picture 3" descr="Working Capital Released.png"/>
           <p:cNvPicPr>
             <a:picLocks noChangeAspect="1"/>
           </p:cNvPicPr>
@@ -4558,8 +4634,8 @@
         </p:blipFill>
         <p:spPr>
           <a:xfrm>
-            <a:off x="914400" y="1371600"/>
-            <a:ext cx="4187568" cy="4572000"/>
+            <a:off x="914400" y="1828800"/>
+            <a:ext cx="3768811" cy="4114800"/>
           </a:xfrm>
           <a:prstGeom prst="rect">
             <a:avLst/>
@@ -4568,7 +4644,7 @@
       </p:pic>
       <p:pic>
         <p:nvPicPr>
-          <p:cNvPr id="4" name="Picture 3" descr="taulia-logo.png"/>
+          <p:cNvPr id="5" name="Picture 4" descr="taulia-logo.png"/>
           <p:cNvPicPr>
             <a:picLocks noChangeAspect="1"/>
           </p:cNvPicPr>
@@ -4583,7 +4659,7 @@
         <p:spPr>
           <a:xfrm>
             <a:off x="7315200" y="365760"/>
-            <a:ext cx="1050029" cy="274320"/>
+            <a:ext cx="1050254" cy="274320"/>
           </a:xfrm>
           <a:prstGeom prst="rect">
             <a:avLst/>
@@ -4592,7 +4668,7 @@
       </p:pic>
       <p:sp>
         <p:nvSpPr>
-          <p:cNvPr id="5" name="TextBox 4"/>
+          <p:cNvPr id="6" name="TextBox 5"/>
           <p:cNvSpPr txBox="1"/>
           <p:nvPr/>
         </p:nvSpPr>
@@ -4623,7 +4699,7 @@
       </p:sp>
       <p:sp>
         <p:nvSpPr>
-          <p:cNvPr id="6" name="Rectangle 5"/>
+          <p:cNvPr id="7" name="Rectangle 6"/>
           <p:cNvSpPr/>
           <p:nvPr/>
         </p:nvSpPr>

</xml_diff>